<commit_message>
Added homework for 04. MondoDB-and-Mongoose
</commit_message>
<xml_diff>
--- a/04. MondoDB-and-Mongoose/MongoDB-and-Mongoose.pptx
+++ b/04. MondoDB-and-Mongoose/MongoDB-and-Mongoose.pptx
@@ -39,7 +39,6 @@
     <p:sldId id="278" r:id="rId33"/>
     <p:sldId id="279" r:id="rId34"/>
     <p:sldId id="285" r:id="rId35"/>
-    <p:sldId id="286" r:id="rId36"/>
   </p:sldIdLst>
   <p:sldSz cx="9144000" cy="6858000" type="screen4x3"/>
   <p:notesSz cx="6858000" cy="9144000"/>
@@ -140,7 +139,18 @@
   </p:defaultTextStyle>
   <p:extLst>
     <p:ext uri="{EFAFB233-063F-42B5-8137-9DF3F51BA10A}">
-      <p15:sldGuideLst xmlns:p15="http://schemas.microsoft.com/office/powerpoint/2012/main" xmlns=""/>
+      <p15:sldGuideLst xmlns:p15="http://schemas.microsoft.com/office/powerpoint/2012/main">
+        <p15:guide id="1" orient="horz" pos="2160">
+          <p15:clr>
+            <a:srgbClr val="A4A3A4"/>
+          </p15:clr>
+        </p15:guide>
+        <p15:guide id="2" pos="2880">
+          <p15:clr>
+            <a:srgbClr val="A4A3A4"/>
+          </p15:clr>
+        </p15:guide>
+      </p15:sldGuideLst>
     </p:ext>
   </p:extLst>
 </p:presentation>
@@ -12221,564 +12231,6 @@
 </p:sld>
 </file>
 
-<file path=ppt/slides/slide35.xml><?xml version="1.0" encoding="utf-8"?>
-<p:sld xmlns:a="http://schemas.openxmlformats.org/drawingml/2006/main" xmlns:r="http://schemas.openxmlformats.org/officeDocument/2006/relationships" xmlns:p="http://schemas.openxmlformats.org/presentationml/2006/main">
-  <p:cSld>
-    <p:spTree>
-      <p:nvGrpSpPr>
-        <p:cNvPr id="1" name=""/>
-        <p:cNvGrpSpPr/>
-        <p:nvPr/>
-      </p:nvGrpSpPr>
-      <p:grpSpPr>
-        <a:xfrm>
-          <a:off x="0" y="0"/>
-          <a:ext cx="0" cy="0"/>
-          <a:chOff x="0" y="0"/>
-          <a:chExt cx="0" cy="0"/>
-        </a:xfrm>
-      </p:grpSpPr>
-      <p:sp>
-        <p:nvSpPr>
-          <p:cNvPr id="6" name="Title 5"/>
-          <p:cNvSpPr>
-            <a:spLocks noGrp="1"/>
-          </p:cNvSpPr>
-          <p:nvPr>
-            <p:ph type="title"/>
-          </p:nvPr>
-        </p:nvSpPr>
-        <p:spPr/>
-        <p:txBody>
-          <a:bodyPr/>
-          <a:lstStyle/>
-          <a:p>
-            <a:r>
-              <a:rPr lang="en-US" dirty="0" smtClean="0"/>
-              <a:t>Homework</a:t>
-            </a:r>
-            <a:endParaRPr lang="en-US" dirty="0"/>
-          </a:p>
-        </p:txBody>
-      </p:sp>
-      <p:sp>
-        <p:nvSpPr>
-          <p:cNvPr id="7" name="Content Placeholder 6"/>
-          <p:cNvSpPr>
-            <a:spLocks noGrp="1"/>
-          </p:cNvSpPr>
-          <p:nvPr>
-            <p:ph idx="1"/>
-          </p:nvPr>
-        </p:nvSpPr>
-        <p:spPr>
-          <a:xfrm>
-            <a:off x="228600" y="852254"/>
-            <a:ext cx="8686800" cy="5791200"/>
-          </a:xfrm>
-        </p:spPr>
-        <p:txBody>
-          <a:bodyPr/>
-          <a:lstStyle/>
-          <a:p>
-            <a:pPr marL="284163" indent="-284163">
-              <a:lnSpc>
-                <a:spcPct val="90000"/>
-              </a:lnSpc>
-              <a:buFont typeface="+mj-lt"/>
-              <a:buAutoNum type="arabicPeriod"/>
-            </a:pPr>
-            <a:r>
-              <a:rPr lang="en-US" sz="2800" dirty="0" smtClean="0"/>
-              <a:t>Create a modules for Chat, that keep the data into a local MongoDB instance</a:t>
-            </a:r>
-          </a:p>
-          <a:p>
-            <a:pPr lvl="1">
-              <a:lnSpc>
-                <a:spcPct val="90000"/>
-              </a:lnSpc>
-            </a:pPr>
-            <a:r>
-              <a:rPr lang="en-US" sz="2600" dirty="0" smtClean="0"/>
-              <a:t>The module should have the following functionality:</a:t>
-            </a:r>
-            <a:endParaRPr lang="en-US" dirty="0"/>
-          </a:p>
-        </p:txBody>
-      </p:sp>
-      <p:sp>
-        <p:nvSpPr>
-          <p:cNvPr id="8" name="Text Placeholder 2"/>
-          <p:cNvSpPr txBox="1">
-            <a:spLocks/>
-          </p:cNvSpPr>
-          <p:nvPr/>
-        </p:nvSpPr>
-        <p:spPr>
-          <a:xfrm>
-            <a:off x="533400" y="2244239"/>
-            <a:ext cx="8077200" cy="4478149"/>
-          </a:xfrm>
-          <a:prstGeom prst="rect">
-            <a:avLst/>
-          </a:prstGeom>
-          <a:solidFill>
-            <a:schemeClr val="accent5">
-              <a:lumMod val="40000"/>
-              <a:lumOff val="60000"/>
-              <a:alpha val="15000"/>
-            </a:schemeClr>
-          </a:solidFill>
-          <a:ln w="12700">
-            <a:solidFill>
-              <a:schemeClr val="accent5">
-                <a:lumMod val="60000"/>
-                <a:lumOff val="40000"/>
-              </a:schemeClr>
-            </a:solidFill>
-          </a:ln>
-        </p:spPr>
-        <p:txBody>
-          <a:bodyPr wrap="square">
-            <a:spAutoFit/>
-          </a:bodyPr>
-          <a:lstStyle>
-            <a:lvl1pPr indent="0" fontAlgn="base">
-              <a:spcBef>
-                <a:spcPts val="0"/>
-              </a:spcBef>
-              <a:spcAft>
-                <a:spcPct val="0"/>
-              </a:spcAft>
-              <a:buClr>
-                <a:schemeClr val="accent5">
-                  <a:lumMod val="40000"/>
-                  <a:lumOff val="60000"/>
-                </a:schemeClr>
-              </a:buClr>
-              <a:buSzPct val="70000"/>
-              <a:buFont typeface="Wingdings 2" pitchFamily="18" charset="2"/>
-              <a:buNone/>
-              <a:defRPr lang="en-US" sz="2000" b="1" smtClean="0">
-                <a:solidFill>
-                  <a:srgbClr val="8CF4F2"/>
-                </a:solidFill>
-                <a:effectLst>
-                  <a:outerShdw blurRad="38100" dist="38100" dir="2700000" algn="tl">
-                    <a:srgbClr val="000000">
-                      <a:alpha val="43137"/>
-                    </a:srgbClr>
-                  </a:outerShdw>
-                </a:effectLst>
-                <a:latin typeface="Consolas" pitchFamily="49" charset="0"/>
-                <a:cs typeface="Consolas" pitchFamily="49" charset="0"/>
-              </a:defRPr>
-            </a:lvl1pPr>
-            <a:lvl2pPr marL="630238" indent="-273050" fontAlgn="base">
-              <a:spcBef>
-                <a:spcPct val="20000"/>
-              </a:spcBef>
-              <a:spcAft>
-                <a:spcPct val="0"/>
-              </a:spcAft>
-              <a:buClr>
-                <a:schemeClr val="accent2">
-                  <a:lumMod val="60000"/>
-                  <a:lumOff val="40000"/>
-                </a:schemeClr>
-              </a:buClr>
-              <a:buFont typeface="Wingdings 2" pitchFamily="18" charset="2"/>
-              <a:buChar char=""/>
-              <a:defRPr sz="3000" b="1">
-                <a:solidFill>
-                  <a:schemeClr val="tx1">
-                    <a:lumMod val="20000"/>
-                    <a:lumOff val="80000"/>
-                  </a:schemeClr>
-                </a:solidFill>
-                <a:effectLst>
-                  <a:outerShdw blurRad="38100" dist="38100" dir="2700000" algn="tl">
-                    <a:srgbClr val="000000">
-                      <a:alpha val="43137"/>
-                    </a:srgbClr>
-                  </a:outerShdw>
-                </a:effectLst>
-              </a:defRPr>
-            </a:lvl2pPr>
-            <a:lvl3pPr marL="922338" indent="-273050" fontAlgn="base">
-              <a:spcBef>
-                <a:spcPct val="20000"/>
-              </a:spcBef>
-              <a:spcAft>
-                <a:spcPct val="0"/>
-              </a:spcAft>
-              <a:buClr>
-                <a:schemeClr val="tx1">
-                  <a:lumMod val="50000"/>
-                </a:schemeClr>
-              </a:buClr>
-              <a:buFont typeface="Wingdings 2" pitchFamily="18" charset="2"/>
-              <a:buChar char=""/>
-              <a:defRPr sz="2800" b="1">
-                <a:solidFill>
-                  <a:schemeClr val="tx1">
-                    <a:lumMod val="20000"/>
-                    <a:lumOff val="80000"/>
-                  </a:schemeClr>
-                </a:solidFill>
-                <a:effectLst>
-                  <a:outerShdw blurRad="38100" dist="38100" dir="2700000" algn="tl">
-                    <a:srgbClr val="000000">
-                      <a:alpha val="43137"/>
-                    </a:srgbClr>
-                  </a:outerShdw>
-                </a:effectLst>
-              </a:defRPr>
-            </a:lvl3pPr>
-            <a:lvl4pPr marL="1187450" indent="-228600" fontAlgn="base">
-              <a:spcBef>
-                <a:spcPct val="20000"/>
-              </a:spcBef>
-              <a:spcAft>
-                <a:spcPct val="0"/>
-              </a:spcAft>
-              <a:buClr>
-                <a:srgbClr val="F8BD52"/>
-              </a:buClr>
-              <a:buFont typeface="Wingdings 2" pitchFamily="18" charset="2"/>
-              <a:buChar char=""/>
-              <a:defRPr sz="2600" b="1">
-                <a:solidFill>
-                  <a:schemeClr val="tx1">
-                    <a:lumMod val="20000"/>
-                    <a:lumOff val="80000"/>
-                  </a:schemeClr>
-                </a:solidFill>
-                <a:effectLst>
-                  <a:outerShdw blurRad="38100" dist="38100" dir="2700000" algn="tl">
-                    <a:srgbClr val="000000">
-                      <a:alpha val="43137"/>
-                    </a:srgbClr>
-                  </a:outerShdw>
-                </a:effectLst>
-              </a:defRPr>
-            </a:lvl4pPr>
-            <a:lvl5pPr marL="1425575" indent="-228600" fontAlgn="base">
-              <a:spcBef>
-                <a:spcPct val="20000"/>
-              </a:spcBef>
-              <a:spcAft>
-                <a:spcPct val="0"/>
-              </a:spcAft>
-              <a:buClr>
-                <a:srgbClr val="46A6BD"/>
-              </a:buClr>
-              <a:buFont typeface="Wingdings 2" pitchFamily="18" charset="2"/>
-              <a:buChar char=""/>
-              <a:defRPr sz="2400" b="1">
-                <a:solidFill>
-                  <a:schemeClr val="tx1">
-                    <a:lumMod val="20000"/>
-                    <a:lumOff val="80000"/>
-                  </a:schemeClr>
-                </a:solidFill>
-                <a:effectLst>
-                  <a:outerShdw blurRad="38100" dist="38100" dir="2700000" algn="tl">
-                    <a:srgbClr val="000000">
-                      <a:alpha val="43137"/>
-                    </a:srgbClr>
-                  </a:outerShdw>
-                </a:effectLst>
-              </a:defRPr>
-            </a:lvl5pPr>
-            <a:lvl6pPr marL="1673352" indent="-228600">
-              <a:spcBef>
-                <a:spcPct val="20000"/>
-              </a:spcBef>
-              <a:buClr>
-                <a:schemeClr val="accent6"/>
-              </a:buClr>
-              <a:buFont typeface="Wingdings 2"/>
-              <a:buChar char=""/>
-              <a:defRPr/>
-            </a:lvl6pPr>
-            <a:lvl7pPr marL="1911096" indent="-228600">
-              <a:spcBef>
-                <a:spcPct val="20000"/>
-              </a:spcBef>
-              <a:buClr>
-                <a:schemeClr val="tx2"/>
-              </a:buClr>
-              <a:buFont typeface="Wingdings 2"/>
-              <a:buChar char=""/>
-              <a:defRPr sz="1600"/>
-            </a:lvl7pPr>
-            <a:lvl8pPr marL="2121408" indent="-182880">
-              <a:spcBef>
-                <a:spcPct val="20000"/>
-              </a:spcBef>
-              <a:buClr>
-                <a:schemeClr val="tx2"/>
-              </a:buClr>
-              <a:buFont typeface="Wingdings 2"/>
-              <a:buChar char=""/>
-              <a:defRPr sz="1400"/>
-            </a:lvl8pPr>
-            <a:lvl9pPr marL="2322576" indent="-182880">
-              <a:spcBef>
-                <a:spcPct val="20000"/>
-              </a:spcBef>
-              <a:buClr>
-                <a:schemeClr val="tx2"/>
-              </a:buClr>
-              <a:buFont typeface="Wingdings 2"/>
-              <a:buChar char=""/>
-              <a:defRPr sz="1400"/>
-            </a:lvl9pPr>
-          </a:lstStyle>
-          <a:p>
-            <a:r>
-              <a:rPr lang="en-US" sz="1800" dirty="0" err="1" smtClean="0"/>
-              <a:t>var</a:t>
-            </a:r>
-            <a:r>
-              <a:rPr lang="en-US" sz="1800" dirty="0" smtClean="0"/>
-              <a:t> </a:t>
-            </a:r>
-            <a:r>
-              <a:rPr lang="en-US" sz="1800" dirty="0" err="1" smtClean="0"/>
-              <a:t>chatDb</a:t>
-            </a:r>
-            <a:r>
-              <a:rPr lang="en-US" sz="1800" dirty="0" smtClean="0"/>
-              <a:t> = require('chat-</a:t>
-            </a:r>
-            <a:r>
-              <a:rPr lang="en-US" sz="1800" dirty="0" err="1" smtClean="0"/>
-              <a:t>db</a:t>
-            </a:r>
-            <a:r>
-              <a:rPr lang="en-US" sz="1800" dirty="0" smtClean="0"/>
-              <a:t>');</a:t>
-            </a:r>
-          </a:p>
-          <a:p>
-            <a:r>
-              <a:rPr lang="en-US" sz="1800" dirty="0" smtClean="0"/>
-              <a:t>//inserts a new user records into the DB</a:t>
-            </a:r>
-          </a:p>
-          <a:p>
-            <a:r>
-              <a:rPr lang="en-US" sz="1800" dirty="0" err="1" smtClean="0"/>
-              <a:t>chatDb.</a:t>
-            </a:r>
-            <a:r>
-              <a:rPr lang="en-US" sz="1800" dirty="0" err="1" smtClean="0">
-                <a:solidFill>
-                  <a:schemeClr val="tx1">
-                    <a:lumMod val="20000"/>
-                    <a:lumOff val="80000"/>
-                  </a:schemeClr>
-                </a:solidFill>
-              </a:rPr>
-              <a:t>registerUser</a:t>
-            </a:r>
-            <a:r>
-              <a:rPr lang="en-US" sz="1800" dirty="0" smtClean="0"/>
-              <a:t>({user: '</a:t>
-            </a:r>
-            <a:r>
-              <a:rPr lang="en-US" sz="1800" dirty="0" err="1" smtClean="0"/>
-              <a:t>DonchoMinkov</a:t>
-            </a:r>
-            <a:r>
-              <a:rPr lang="en-US" sz="1800" dirty="0" smtClean="0"/>
-              <a:t>', pass: '123456q'});</a:t>
-            </a:r>
-          </a:p>
-          <a:p>
-            <a:pPr>
-              <a:spcBef>
-                <a:spcPts val="900"/>
-              </a:spcBef>
-            </a:pPr>
-            <a:r>
-              <a:rPr lang="en-US" sz="1800" dirty="0" smtClean="0"/>
-              <a:t>//inserts a new message record into the DB</a:t>
-            </a:r>
-          </a:p>
-          <a:p>
-            <a:r>
-              <a:rPr lang="en-US" sz="1800" dirty="0" smtClean="0"/>
-              <a:t>//the message has two references to users (from and to)</a:t>
-            </a:r>
-          </a:p>
-          <a:p>
-            <a:r>
-              <a:rPr lang="en-US" sz="1800" dirty="0" err="1" smtClean="0"/>
-              <a:t>chatDb.</a:t>
-            </a:r>
-            <a:r>
-              <a:rPr lang="en-US" sz="1800" dirty="0" err="1" smtClean="0">
-                <a:solidFill>
-                  <a:schemeClr val="tx1">
-                    <a:lumMod val="20000"/>
-                    <a:lumOff val="80000"/>
-                  </a:schemeClr>
-                </a:solidFill>
-              </a:rPr>
-              <a:t>sendMessage</a:t>
-            </a:r>
-            <a:r>
-              <a:rPr lang="en-US" sz="1800" dirty="0" smtClean="0"/>
-              <a:t>({</a:t>
-            </a:r>
-          </a:p>
-          <a:p>
-            <a:r>
-              <a:rPr lang="en-US" sz="1800" dirty="0" smtClean="0"/>
-              <a:t>  from: '</a:t>
-            </a:r>
-            <a:r>
-              <a:rPr lang="en-US" sz="1800" dirty="0" err="1" smtClean="0"/>
-              <a:t>DonchoMinkov</a:t>
-            </a:r>
-            <a:r>
-              <a:rPr lang="en-US" sz="1800" dirty="0" smtClean="0"/>
-              <a:t>',</a:t>
-            </a:r>
-          </a:p>
-          <a:p>
-            <a:r>
-              <a:rPr lang="en-US" sz="1800" dirty="0"/>
-              <a:t> </a:t>
-            </a:r>
-            <a:r>
-              <a:rPr lang="en-US" sz="1800" dirty="0" smtClean="0"/>
-              <a:t> to: '</a:t>
-            </a:r>
-            <a:r>
-              <a:rPr lang="en-US" sz="1800" dirty="0" err="1" smtClean="0"/>
-              <a:t>NikolayKostov</a:t>
-            </a:r>
-            <a:r>
-              <a:rPr lang="en-US" sz="1800" dirty="0" smtClean="0"/>
-              <a:t>',</a:t>
-            </a:r>
-          </a:p>
-          <a:p>
-            <a:r>
-              <a:rPr lang="en-US" sz="1800" dirty="0"/>
-              <a:t> </a:t>
-            </a:r>
-            <a:r>
-              <a:rPr lang="en-US" sz="1800" dirty="0" smtClean="0"/>
-              <a:t> text: 'Hey, </a:t>
-            </a:r>
-            <a:r>
-              <a:rPr lang="en-US" sz="1800" dirty="0" err="1" smtClean="0"/>
-              <a:t>Niki</a:t>
-            </a:r>
-            <a:r>
-              <a:rPr lang="en-US" sz="1800" dirty="0" smtClean="0"/>
-              <a:t>!'</a:t>
-            </a:r>
-          </a:p>
-          <a:p>
-            <a:r>
-              <a:rPr lang="en-US" sz="1800" dirty="0" smtClean="0"/>
-              <a:t>});</a:t>
-            </a:r>
-          </a:p>
-          <a:p>
-            <a:pPr>
-              <a:spcBef>
-                <a:spcPts val="900"/>
-              </a:spcBef>
-            </a:pPr>
-            <a:r>
-              <a:rPr lang="en-US" sz="1800" dirty="0" smtClean="0"/>
-              <a:t>//returns an array with all messages between two users</a:t>
-            </a:r>
-            <a:endParaRPr lang="en-US" sz="1800" dirty="0"/>
-          </a:p>
-          <a:p>
-            <a:r>
-              <a:rPr lang="en-US" sz="1800" dirty="0" err="1" smtClean="0"/>
-              <a:t>chatDb.</a:t>
-            </a:r>
-            <a:r>
-              <a:rPr lang="en-US" sz="1800" dirty="0" err="1" smtClean="0">
-                <a:solidFill>
-                  <a:schemeClr val="tx1">
-                    <a:lumMod val="20000"/>
-                    <a:lumOff val="80000"/>
-                  </a:schemeClr>
-                </a:solidFill>
-              </a:rPr>
-              <a:t>getMessages</a:t>
-            </a:r>
-            <a:r>
-              <a:rPr lang="en-US" sz="1800" dirty="0" smtClean="0"/>
-              <a:t>({</a:t>
-            </a:r>
-          </a:p>
-          <a:p>
-            <a:r>
-              <a:rPr lang="en-US" sz="1800" dirty="0"/>
-              <a:t> </a:t>
-            </a:r>
-            <a:r>
-              <a:rPr lang="en-US" sz="1800" dirty="0" smtClean="0"/>
-              <a:t> with: '</a:t>
-            </a:r>
-            <a:r>
-              <a:rPr lang="en-US" sz="1800" dirty="0" err="1" smtClean="0"/>
-              <a:t>DonchoMinkov</a:t>
-            </a:r>
-            <a:r>
-              <a:rPr lang="en-US" sz="1800" dirty="0" smtClean="0"/>
-              <a:t>',</a:t>
-            </a:r>
-          </a:p>
-          <a:p>
-            <a:r>
-              <a:rPr lang="en-US" sz="1800" dirty="0"/>
-              <a:t> </a:t>
-            </a:r>
-            <a:r>
-              <a:rPr lang="en-US" sz="1800" dirty="0" smtClean="0"/>
-              <a:t> and: '</a:t>
-            </a:r>
-            <a:r>
-              <a:rPr lang="en-US" sz="1800" dirty="0" err="1" smtClean="0"/>
-              <a:t>NikolayKostov</a:t>
-            </a:r>
-            <a:endParaRPr lang="en-US" sz="1800" dirty="0" smtClean="0"/>
-          </a:p>
-          <a:p>
-            <a:r>
-              <a:rPr lang="en-US" sz="1800" dirty="0" smtClean="0"/>
-              <a:t>});</a:t>
-            </a:r>
-          </a:p>
-        </p:txBody>
-      </p:sp>
-    </p:spTree>
-    <p:extLst>
-      <p:ext uri="{BB962C8B-B14F-4D97-AF65-F5344CB8AC3E}">
-        <p14:creationId xmlns:p14="http://schemas.microsoft.com/office/powerpoint/2010/main" val="3476409195"/>
-      </p:ext>
-    </p:extLst>
-  </p:cSld>
-  <p:clrMapOvr>
-    <a:masterClrMapping/>
-  </p:clrMapOvr>
-</p:sld>
-</file>
-
 <file path=ppt/slides/slide4.xml><?xml version="1.0" encoding="utf-8"?>
 <p:sld xmlns:a="http://schemas.openxmlformats.org/drawingml/2006/main" xmlns:r="http://schemas.openxmlformats.org/officeDocument/2006/relationships" xmlns:p="http://schemas.openxmlformats.org/presentationml/2006/main">
   <p:cSld>
@@ -14932,11 +14384,7 @@
             </a:r>
             <a:r>
               <a:rPr lang="en-US" dirty="0" smtClean="0"/>
-              <a:t> </a:t>
-            </a:r>
-            <a:r>
-              <a:rPr lang="en-US" dirty="0" smtClean="0"/>
-              <a:t>= new </a:t>
+              <a:t> = new </a:t>
             </a:r>
             <a:r>
               <a:rPr lang="en-US" dirty="0" err="1" smtClean="0"/>
@@ -16201,7 +15649,7 @@
   <a:extraClrSchemeLst/>
   <a:extLst>
     <a:ext uri="{05A4C25C-085E-4340-85A3-A5531E510DB2}">
-      <thm15:themeFamily xmlns:thm15="http://schemas.microsoft.com/office/thememl/2012/main" xmlns="" name="Telerik Academy theme" id="{2620D71C-A5FD-46E0-A488-16D4CF22AEE2}" vid="{F028A4D3-6851-4D6D-A82D-72CBFB9A818D}"/>
+      <thm15:themeFamily xmlns:thm15="http://schemas.microsoft.com/office/thememl/2012/main" name="Telerik Academy theme" id="{2620D71C-A5FD-46E0-A488-16D4CF22AEE2}" vid="{F028A4D3-6851-4D6D-A82D-72CBFB9A818D}"/>
     </a:ext>
   </a:extLst>
 </a:theme>

</xml_diff>